<commit_message>
create slides for r tutorial
</commit_message>
<xml_diff>
--- a/slides/table.pptx
+++ b/slides/table.pptx
@@ -2260,10 +2260,10 @@
                               <a:alpha val="100000"/>
                             </a:srgbClr>
                           </a:solidFill>
-                          <a:latin typeface="Arial"/>
-                          <a:cs typeface="Arial"/>
-                          <a:ea typeface="Arial"/>
-                          <a:sym typeface="Arial"/>
+                          <a:latin typeface="DejaVu Sans"/>
+                          <a:cs typeface="DejaVu Sans"/>
+                          <a:ea typeface="DejaVu Sans"/>
+                          <a:sym typeface="DejaVu Sans"/>
                         </a:rPr>
                         <a:t> </a:t>
                       </a:r>
@@ -2325,10 +2325,10 @@
                               <a:alpha val="100000"/>
                             </a:srgbClr>
                           </a:solidFill>
-                          <a:latin typeface="Arial"/>
-                          <a:cs typeface="Arial"/>
-                          <a:ea typeface="Arial"/>
-                          <a:sym typeface="Arial"/>
+                          <a:latin typeface="DejaVu Sans"/>
+                          <a:cs typeface="DejaVu Sans"/>
+                          <a:ea typeface="DejaVu Sans"/>
+                          <a:sym typeface="DejaVu Sans"/>
                         </a:rPr>
                         <a:t>(1)</a:t>
                       </a:r>
@@ -2390,10 +2390,10 @@
                               <a:alpha val="100000"/>
                             </a:srgbClr>
                           </a:solidFill>
-                          <a:latin typeface="Arial"/>
-                          <a:cs typeface="Arial"/>
-                          <a:ea typeface="Arial"/>
-                          <a:sym typeface="Arial"/>
+                          <a:latin typeface="DejaVu Sans"/>
+                          <a:cs typeface="DejaVu Sans"/>
+                          <a:ea typeface="DejaVu Sans"/>
+                          <a:sym typeface="DejaVu Sans"/>
                         </a:rPr>
                         <a:t>(2)</a:t>
                       </a:r>
@@ -2457,10 +2457,10 @@
                               <a:alpha val="100000"/>
                             </a:srgbClr>
                           </a:solidFill>
-                          <a:latin typeface="Arial"/>
-                          <a:cs typeface="Arial"/>
-                          <a:ea typeface="Arial"/>
-                          <a:sym typeface="Arial"/>
+                          <a:latin typeface="DejaVu Sans"/>
+                          <a:cs typeface="DejaVu Sans"/>
+                          <a:ea typeface="DejaVu Sans"/>
+                          <a:sym typeface="DejaVu Sans"/>
                         </a:rPr>
                         <a:t>(Intercept)</a:t>
                       </a:r>
@@ -2514,10 +2514,10 @@
                               <a:alpha val="100000"/>
                             </a:srgbClr>
                           </a:solidFill>
-                          <a:latin typeface="Arial"/>
-                          <a:cs typeface="Arial"/>
-                          <a:ea typeface="Arial"/>
-                          <a:sym typeface="Arial"/>
+                          <a:latin typeface="DejaVu Sans"/>
+                          <a:cs typeface="DejaVu Sans"/>
+                          <a:ea typeface="DejaVu Sans"/>
+                          <a:sym typeface="DejaVu Sans"/>
                         </a:rPr>
                         <a:t>11.487*** (0.241)</a:t>
                       </a:r>
@@ -2571,10 +2571,10 @@
                               <a:alpha val="100000"/>
                             </a:srgbClr>
                           </a:solidFill>
-                          <a:latin typeface="Arial"/>
-                          <a:cs typeface="Arial"/>
-                          <a:ea typeface="Arial"/>
-                          <a:sym typeface="Arial"/>
+                          <a:latin typeface="DejaVu Sans"/>
+                          <a:cs typeface="DejaVu Sans"/>
+                          <a:ea typeface="DejaVu Sans"/>
+                          <a:sym typeface="DejaVu Sans"/>
                         </a:rPr>
                         <a:t>12.078*** (0.265)</a:t>
                       </a:r>
@@ -2630,10 +2630,10 @@
                               <a:alpha val="100000"/>
                             </a:srgbClr>
                           </a:solidFill>
-                          <a:latin typeface="Arial"/>
-                          <a:cs typeface="Arial"/>
-                          <a:ea typeface="Arial"/>
-                          <a:sym typeface="Arial"/>
+                          <a:latin typeface="DejaVu Sans"/>
+                          <a:cs typeface="DejaVu Sans"/>
+                          <a:ea typeface="DejaVu Sans"/>
+                          <a:sym typeface="DejaVu Sans"/>
                         </a:rPr>
                         <a:t>treatment</a:t>
                       </a:r>
@@ -2687,10 +2687,10 @@
                               <a:alpha val="100000"/>
                             </a:srgbClr>
                           </a:solidFill>
-                          <a:latin typeface="Arial"/>
-                          <a:cs typeface="Arial"/>
-                          <a:ea typeface="Arial"/>
-                          <a:sym typeface="Arial"/>
+                          <a:latin typeface="DejaVu Sans"/>
+                          <a:cs typeface="DejaVu Sans"/>
+                          <a:ea typeface="DejaVu Sans"/>
+                          <a:sym typeface="DejaVu Sans"/>
                         </a:rPr>
                         <a:t>-0.604* (0.278)</a:t>
                       </a:r>
@@ -2744,10 +2744,10 @@
                               <a:alpha val="100000"/>
                             </a:srgbClr>
                           </a:solidFill>
-                          <a:latin typeface="Arial"/>
-                          <a:cs typeface="Arial"/>
-                          <a:ea typeface="Arial"/>
-                          <a:sym typeface="Arial"/>
+                          <a:latin typeface="DejaVu Sans"/>
+                          <a:cs typeface="DejaVu Sans"/>
+                          <a:ea typeface="DejaVu Sans"/>
+                          <a:sym typeface="DejaVu Sans"/>
                         </a:rPr>
                         <a:t>-1.785*** (0.375)</a:t>
                       </a:r>
@@ -2803,10 +2803,10 @@
                               <a:alpha val="100000"/>
                             </a:srgbClr>
                           </a:solidFill>
-                          <a:latin typeface="Arial"/>
-                          <a:cs typeface="Arial"/>
-                          <a:ea typeface="Arial"/>
-                          <a:sym typeface="Arial"/>
+                          <a:latin typeface="DejaVu Sans"/>
+                          <a:cs typeface="DejaVu Sans"/>
+                          <a:ea typeface="DejaVu Sans"/>
+                          <a:sym typeface="DejaVu Sans"/>
                         </a:rPr>
                         <a:t>post</a:t>
                       </a:r>
@@ -2860,10 +2860,10 @@
                               <a:alpha val="100000"/>
                             </a:srgbClr>
                           </a:solidFill>
-                          <a:latin typeface="Arial"/>
-                          <a:cs typeface="Arial"/>
-                          <a:ea typeface="Arial"/>
-                          <a:sym typeface="Arial"/>
+                          <a:latin typeface="DejaVu Sans"/>
+                          <a:cs typeface="DejaVu Sans"/>
+                          <a:ea typeface="DejaVu Sans"/>
+                          <a:sym typeface="DejaVu Sans"/>
                         </a:rPr>
                         <a:t>-1.405*** (0.278)</a:t>
                       </a:r>
@@ -2917,10 +2917,10 @@
                               <a:alpha val="100000"/>
                             </a:srgbClr>
                           </a:solidFill>
-                          <a:latin typeface="Arial"/>
-                          <a:cs typeface="Arial"/>
-                          <a:ea typeface="Arial"/>
-                          <a:sym typeface="Arial"/>
+                          <a:latin typeface="DejaVu Sans"/>
+                          <a:cs typeface="DejaVu Sans"/>
+                          <a:ea typeface="DejaVu Sans"/>
+                          <a:sym typeface="DejaVu Sans"/>
                         </a:rPr>
                         <a:t>-2.585*** (0.375)</a:t>
                       </a:r>
@@ -2976,10 +2976,10 @@
                               <a:alpha val="100000"/>
                             </a:srgbClr>
                           </a:solidFill>
-                          <a:latin typeface="Arial"/>
-                          <a:cs typeface="Arial"/>
-                          <a:ea typeface="Arial"/>
-                          <a:sym typeface="Arial"/>
+                          <a:latin typeface="DejaVu Sans"/>
+                          <a:cs typeface="DejaVu Sans"/>
+                          <a:ea typeface="DejaVu Sans"/>
+                          <a:sym typeface="DejaVu Sans"/>
                         </a:rPr>
                         <a:t>treatment × post</a:t>
                       </a:r>
@@ -3033,10 +3033,10 @@
                               <a:alpha val="100000"/>
                             </a:srgbClr>
                           </a:solidFill>
-                          <a:latin typeface="Arial"/>
-                          <a:cs typeface="Arial"/>
-                          <a:ea typeface="Arial"/>
-                          <a:sym typeface="Arial"/>
+                          <a:latin typeface="DejaVu Sans"/>
+                          <a:cs typeface="DejaVu Sans"/>
+                          <a:ea typeface="DejaVu Sans"/>
+                          <a:sym typeface="DejaVu Sans"/>
                         </a:rPr>
                         <a:t/>
                       </a:r>
@@ -3090,10 +3090,10 @@
                               <a:alpha val="100000"/>
                             </a:srgbClr>
                           </a:solidFill>
-                          <a:latin typeface="Arial"/>
-                          <a:cs typeface="Arial"/>
-                          <a:ea typeface="Arial"/>
-                          <a:sym typeface="Arial"/>
+                          <a:latin typeface="DejaVu Sans"/>
+                          <a:cs typeface="DejaVu Sans"/>
+                          <a:ea typeface="DejaVu Sans"/>
+                          <a:sym typeface="DejaVu Sans"/>
                         </a:rPr>
                         <a:t>2.361*** (0.531)</a:t>
                       </a:r>
@@ -3149,10 +3149,10 @@
                               <a:alpha val="100000"/>
                             </a:srgbClr>
                           </a:solidFill>
-                          <a:latin typeface="Arial"/>
-                          <a:cs typeface="Arial"/>
-                          <a:ea typeface="Arial"/>
-                          <a:sym typeface="Arial"/>
+                          <a:latin typeface="DejaVu Sans"/>
+                          <a:cs typeface="DejaVu Sans"/>
+                          <a:ea typeface="DejaVu Sans"/>
+                          <a:sym typeface="DejaVu Sans"/>
                         </a:rPr>
                         <a:t>Num.Obs.</a:t>
                       </a:r>
@@ -3210,10 +3210,10 @@
                               <a:alpha val="100000"/>
                             </a:srgbClr>
                           </a:solidFill>
-                          <a:latin typeface="Arial"/>
-                          <a:cs typeface="Arial"/>
-                          <a:ea typeface="Arial"/>
-                          <a:sym typeface="Arial"/>
+                          <a:latin typeface="DejaVu Sans"/>
+                          <a:cs typeface="DejaVu Sans"/>
+                          <a:ea typeface="DejaVu Sans"/>
+                          <a:sym typeface="DejaVu Sans"/>
                         </a:rPr>
                         <a:t>200</a:t>
                       </a:r>
@@ -3271,10 +3271,10 @@
                               <a:alpha val="100000"/>
                             </a:srgbClr>
                           </a:solidFill>
-                          <a:latin typeface="Arial"/>
-                          <a:cs typeface="Arial"/>
-                          <a:ea typeface="Arial"/>
-                          <a:sym typeface="Arial"/>
+                          <a:latin typeface="DejaVu Sans"/>
+                          <a:cs typeface="DejaVu Sans"/>
+                          <a:ea typeface="DejaVu Sans"/>
+                          <a:sym typeface="DejaVu Sans"/>
                         </a:rPr>
                         <a:t>200</a:t>
                       </a:r>
@@ -3334,10 +3334,10 @@
                               <a:alpha val="100000"/>
                             </a:srgbClr>
                           </a:solidFill>
-                          <a:latin typeface="Arial"/>
-                          <a:cs typeface="Arial"/>
-                          <a:ea typeface="Arial"/>
-                          <a:sym typeface="Arial"/>
+                          <a:latin typeface="DejaVu Sans"/>
+                          <a:cs typeface="DejaVu Sans"/>
+                          <a:ea typeface="DejaVu Sans"/>
+                          <a:sym typeface="DejaVu Sans"/>
                         </a:rPr>
                         <a:t>R2 Adj.</a:t>
                       </a:r>
@@ -3395,10 +3395,10 @@
                               <a:alpha val="100000"/>
                             </a:srgbClr>
                           </a:solidFill>
-                          <a:latin typeface="Arial"/>
-                          <a:cs typeface="Arial"/>
-                          <a:ea typeface="Arial"/>
-                          <a:sym typeface="Arial"/>
+                          <a:latin typeface="DejaVu Sans"/>
+                          <a:cs typeface="DejaVu Sans"/>
+                          <a:ea typeface="DejaVu Sans"/>
+                          <a:sym typeface="DejaVu Sans"/>
                         </a:rPr>
                         <a:t>0.124</a:t>
                       </a:r>
@@ -3456,10 +3456,10 @@
                               <a:alpha val="100000"/>
                             </a:srgbClr>
                           </a:solidFill>
-                          <a:latin typeface="Arial"/>
-                          <a:cs typeface="Arial"/>
-                          <a:ea typeface="Arial"/>
-                          <a:sym typeface="Arial"/>
+                          <a:latin typeface="DejaVu Sans"/>
+                          <a:cs typeface="DejaVu Sans"/>
+                          <a:ea typeface="DejaVu Sans"/>
+                          <a:sym typeface="DejaVu Sans"/>
                         </a:rPr>
                         <a:t>0.201</a:t>
                       </a:r>

</xml_diff>